<commit_message>
- update overview diagram - fix CFO_calc test
</commit_message>
<xml_diff>
--- a/doc/overview.pptx
+++ b/doc/overview.pptx
@@ -104,6 +104,11 @@
       </a:defRPr>
     </a:lvl9pPr>
   </p:defaultTextStyle>
+  <p:extLst>
+    <p:ext uri="{EFAFB233-063F-42B5-8137-9DF3F51BA10A}">
+      <p15:sldGuideLst xmlns:p15="http://schemas.microsoft.com/office/powerpoint/2012/main"/>
+    </p:ext>
+  </p:extLst>
 </p:presentation>
 </file>
 
@@ -256,7 +261,7 @@
           <a:p>
             <a:fld id="{0647E4D3-4269-40FF-ADD2-F433546F1734}" type="datetimeFigureOut">
               <a:rPr lang="en-GB" smtClean="0"/>
-              <a:t>09/02/2023</a:t>
+              <a:t>10/02/2023</a:t>
             </a:fld>
             <a:endParaRPr lang="en-GB"/>
           </a:p>
@@ -456,7 +461,7 @@
           <a:p>
             <a:fld id="{0647E4D3-4269-40FF-ADD2-F433546F1734}" type="datetimeFigureOut">
               <a:rPr lang="en-GB" smtClean="0"/>
-              <a:t>09/02/2023</a:t>
+              <a:t>10/02/2023</a:t>
             </a:fld>
             <a:endParaRPr lang="en-GB"/>
           </a:p>
@@ -666,7 +671,7 @@
           <a:p>
             <a:fld id="{0647E4D3-4269-40FF-ADD2-F433546F1734}" type="datetimeFigureOut">
               <a:rPr lang="en-GB" smtClean="0"/>
-              <a:t>09/02/2023</a:t>
+              <a:t>10/02/2023</a:t>
             </a:fld>
             <a:endParaRPr lang="en-GB"/>
           </a:p>
@@ -866,7 +871,7 @@
           <a:p>
             <a:fld id="{0647E4D3-4269-40FF-ADD2-F433546F1734}" type="datetimeFigureOut">
               <a:rPr lang="en-GB" smtClean="0"/>
-              <a:t>09/02/2023</a:t>
+              <a:t>10/02/2023</a:t>
             </a:fld>
             <a:endParaRPr lang="en-GB"/>
           </a:p>
@@ -1142,7 +1147,7 @@
           <a:p>
             <a:fld id="{0647E4D3-4269-40FF-ADD2-F433546F1734}" type="datetimeFigureOut">
               <a:rPr lang="en-GB" smtClean="0"/>
-              <a:t>09/02/2023</a:t>
+              <a:t>10/02/2023</a:t>
             </a:fld>
             <a:endParaRPr lang="en-GB"/>
           </a:p>
@@ -1410,7 +1415,7 @@
           <a:p>
             <a:fld id="{0647E4D3-4269-40FF-ADD2-F433546F1734}" type="datetimeFigureOut">
               <a:rPr lang="en-GB" smtClean="0"/>
-              <a:t>09/02/2023</a:t>
+              <a:t>10/02/2023</a:t>
             </a:fld>
             <a:endParaRPr lang="en-GB"/>
           </a:p>
@@ -1825,7 +1830,7 @@
           <a:p>
             <a:fld id="{0647E4D3-4269-40FF-ADD2-F433546F1734}" type="datetimeFigureOut">
               <a:rPr lang="en-GB" smtClean="0"/>
-              <a:t>09/02/2023</a:t>
+              <a:t>10/02/2023</a:t>
             </a:fld>
             <a:endParaRPr lang="en-GB"/>
           </a:p>
@@ -1967,7 +1972,7 @@
           <a:p>
             <a:fld id="{0647E4D3-4269-40FF-ADD2-F433546F1734}" type="datetimeFigureOut">
               <a:rPr lang="en-GB" smtClean="0"/>
-              <a:t>09/02/2023</a:t>
+              <a:t>10/02/2023</a:t>
             </a:fld>
             <a:endParaRPr lang="en-GB"/>
           </a:p>
@@ -2080,7 +2085,7 @@
           <a:p>
             <a:fld id="{0647E4D3-4269-40FF-ADD2-F433546F1734}" type="datetimeFigureOut">
               <a:rPr lang="en-GB" smtClean="0"/>
-              <a:t>09/02/2023</a:t>
+              <a:t>10/02/2023</a:t>
             </a:fld>
             <a:endParaRPr lang="en-GB"/>
           </a:p>
@@ -2393,7 +2398,7 @@
           <a:p>
             <a:fld id="{0647E4D3-4269-40FF-ADD2-F433546F1734}" type="datetimeFigureOut">
               <a:rPr lang="en-GB" smtClean="0"/>
-              <a:t>09/02/2023</a:t>
+              <a:t>10/02/2023</a:t>
             </a:fld>
             <a:endParaRPr lang="en-GB"/>
           </a:p>
@@ -2682,7 +2687,7 @@
           <a:p>
             <a:fld id="{0647E4D3-4269-40FF-ADD2-F433546F1734}" type="datetimeFigureOut">
               <a:rPr lang="en-GB" smtClean="0"/>
-              <a:t>09/02/2023</a:t>
+              <a:t>10/02/2023</a:t>
             </a:fld>
             <a:endParaRPr lang="en-GB"/>
           </a:p>
@@ -2925,7 +2930,7 @@
           <a:p>
             <a:fld id="{0647E4D3-4269-40FF-ADD2-F433546F1734}" type="datetimeFigureOut">
               <a:rPr lang="en-GB" smtClean="0"/>
-              <a:t>09/02/2023</a:t>
+              <a:t>10/02/2023</a:t>
             </a:fld>
             <a:endParaRPr lang="en-GB"/>
           </a:p>
@@ -4389,7 +4394,7 @@
         </p:nvSpPr>
         <p:spPr>
           <a:xfrm>
-            <a:off x="1452639" y="3004252"/>
+            <a:off x="668776" y="2405858"/>
             <a:ext cx="846707" cy="276999"/>
           </a:xfrm>
           <a:prstGeom prst="rect">
@@ -4425,7 +4430,7 @@
         </p:nvSpPr>
         <p:spPr>
           <a:xfrm>
-            <a:off x="4650823" y="2986009"/>
+            <a:off x="3837261" y="2394043"/>
             <a:ext cx="846707" cy="276999"/>
           </a:xfrm>
           <a:prstGeom prst="rect">
@@ -4952,13 +4957,12 @@
           </p:cNvPr>
           <p:cNvCxnSpPr>
             <a:cxnSpLocks/>
-            <a:stCxn id="7" idx="0"/>
           </p:cNvCxnSpPr>
           <p:nvPr/>
         </p:nvCxnSpPr>
         <p:spPr>
           <a:xfrm flipV="1">
-            <a:off x="6640319" y="823440"/>
+            <a:off x="8235164" y="815076"/>
             <a:ext cx="0" cy="976371"/>
           </a:xfrm>
           <a:prstGeom prst="line">
@@ -5366,7 +5370,7 @@
         <p:spPr>
           <a:xfrm>
             <a:off x="4666263" y="823440"/>
-            <a:ext cx="1965839" cy="8824"/>
+            <a:ext cx="3568901" cy="0"/>
           </a:xfrm>
           <a:prstGeom prst="line">
             <a:avLst/>
@@ -5419,6 +5423,237 @@
             <a:r>
               <a:rPr lang="en-US" sz="1200" dirty="0"/>
               <a:t>16 bit I/Q</a:t>
+            </a:r>
+            <a:endParaRPr lang="en-GB" sz="1200" dirty="0"/>
+          </a:p>
+        </p:txBody>
+      </p:sp>
+      <p:sp>
+        <p:nvSpPr>
+          <p:cNvPr id="2" name="Rectangle 1">
+            <a:extLst>
+              <a:ext uri="{FF2B5EF4-FFF2-40B4-BE49-F238E27FC236}">
+                <a16:creationId xmlns:a16="http://schemas.microsoft.com/office/drawing/2014/main" id="{7EA4FE7E-6846-E249-AC11-0BC697C700E6}"/>
+              </a:ext>
+            </a:extLst>
+          </p:cNvPr>
+          <p:cNvSpPr/>
+          <p:nvPr/>
+        </p:nvSpPr>
+        <p:spPr>
+          <a:xfrm>
+            <a:off x="7838924" y="1799811"/>
+            <a:ext cx="792480" cy="1206137"/>
+          </a:xfrm>
+          <a:prstGeom prst="rect">
+            <a:avLst/>
+          </a:prstGeom>
+          <a:solidFill>
+            <a:schemeClr val="bg1"/>
+          </a:solidFill>
+        </p:spPr>
+        <p:style>
+          <a:lnRef idx="2">
+            <a:schemeClr val="accent1">
+              <a:shade val="50000"/>
+            </a:schemeClr>
+          </a:lnRef>
+          <a:fillRef idx="1">
+            <a:schemeClr val="accent1"/>
+          </a:fillRef>
+          <a:effectRef idx="0">
+            <a:schemeClr val="accent1"/>
+          </a:effectRef>
+          <a:fontRef idx="minor">
+            <a:schemeClr val="lt1"/>
+          </a:fontRef>
+        </p:style>
+        <p:txBody>
+          <a:bodyPr rtlCol="0" anchor="ctr"/>
+          <a:lstStyle/>
+          <a:p>
+            <a:pPr algn="ctr"/>
+            <a:r>
+              <a:rPr lang="en-US" dirty="0">
+                <a:ln w="0"/>
+                <a:solidFill>
+                  <a:schemeClr val="tx1"/>
+                </a:solidFill>
+                <a:effectLst>
+                  <a:outerShdw blurRad="38100" dist="19050" dir="2700000" algn="tl" rotWithShape="0">
+                    <a:schemeClr val="dk1">
+                      <a:alpha val="40000"/>
+                    </a:schemeClr>
+                  </a:outerShdw>
+                </a:effectLst>
+              </a:rPr>
+              <a:t>CFO calc</a:t>
+            </a:r>
+            <a:endParaRPr lang="en-GB" dirty="0">
+              <a:ln w="0"/>
+              <a:solidFill>
+                <a:schemeClr val="tx1"/>
+              </a:solidFill>
+              <a:effectLst>
+                <a:outerShdw blurRad="38100" dist="19050" dir="2700000" algn="tl" rotWithShape="0">
+                  <a:schemeClr val="dk1">
+                    <a:alpha val="40000"/>
+                  </a:schemeClr>
+                </a:outerShdw>
+              </a:effectLst>
+            </a:endParaRPr>
+          </a:p>
+        </p:txBody>
+      </p:sp>
+      <p:cxnSp>
+        <p:nvCxnSpPr>
+          <p:cNvPr id="3" name="Straight Arrow Connector 2">
+            <a:extLst>
+              <a:ext uri="{FF2B5EF4-FFF2-40B4-BE49-F238E27FC236}">
+                <a16:creationId xmlns:a16="http://schemas.microsoft.com/office/drawing/2014/main" id="{87D3E2B2-8356-46FB-64DF-570471996066}"/>
+              </a:ext>
+            </a:extLst>
+          </p:cNvPr>
+          <p:cNvCxnSpPr>
+            <a:cxnSpLocks/>
+          </p:cNvCxnSpPr>
+          <p:nvPr/>
+        </p:nvCxnSpPr>
+        <p:spPr>
+          <a:xfrm>
+            <a:off x="7036559" y="2191109"/>
+            <a:ext cx="800775" cy="0"/>
+          </a:xfrm>
+          <a:prstGeom prst="straightConnector1">
+            <a:avLst/>
+          </a:prstGeom>
+          <a:ln w="19050">
+            <a:tailEnd type="triangle"/>
+          </a:ln>
+        </p:spPr>
+        <p:style>
+          <a:lnRef idx="1">
+            <a:schemeClr val="accent1"/>
+          </a:lnRef>
+          <a:fillRef idx="0">
+            <a:schemeClr val="accent1"/>
+          </a:fillRef>
+          <a:effectRef idx="0">
+            <a:schemeClr val="accent1"/>
+          </a:effectRef>
+          <a:fontRef idx="minor">
+            <a:schemeClr val="tx1"/>
+          </a:fontRef>
+        </p:style>
+      </p:cxnSp>
+      <p:cxnSp>
+        <p:nvCxnSpPr>
+          <p:cNvPr id="11" name="Straight Arrow Connector 10">
+            <a:extLst>
+              <a:ext uri="{FF2B5EF4-FFF2-40B4-BE49-F238E27FC236}">
+                <a16:creationId xmlns:a16="http://schemas.microsoft.com/office/drawing/2014/main" id="{70B3A807-B9E8-1D46-02F6-7D5FB7F0CE16}"/>
+              </a:ext>
+            </a:extLst>
+          </p:cNvPr>
+          <p:cNvCxnSpPr>
+            <a:cxnSpLocks/>
+          </p:cNvCxnSpPr>
+          <p:nvPr/>
+        </p:nvCxnSpPr>
+        <p:spPr>
+          <a:xfrm>
+            <a:off x="7043703" y="2509763"/>
+            <a:ext cx="800775" cy="0"/>
+          </a:xfrm>
+          <a:prstGeom prst="straightConnector1">
+            <a:avLst/>
+          </a:prstGeom>
+          <a:ln w="19050">
+            <a:tailEnd type="triangle"/>
+          </a:ln>
+        </p:spPr>
+        <p:style>
+          <a:lnRef idx="1">
+            <a:schemeClr val="accent1"/>
+          </a:lnRef>
+          <a:fillRef idx="0">
+            <a:schemeClr val="accent1"/>
+          </a:fillRef>
+          <a:effectRef idx="0">
+            <a:schemeClr val="accent1"/>
+          </a:effectRef>
+          <a:fontRef idx="minor">
+            <a:schemeClr val="tx1"/>
+          </a:fontRef>
+        </p:style>
+      </p:cxnSp>
+      <p:sp>
+        <p:nvSpPr>
+          <p:cNvPr id="14" name="TextBox 13">
+            <a:extLst>
+              <a:ext uri="{FF2B5EF4-FFF2-40B4-BE49-F238E27FC236}">
+                <a16:creationId xmlns:a16="http://schemas.microsoft.com/office/drawing/2014/main" id="{7D864CEE-D456-549F-A086-C1E498E78124}"/>
+              </a:ext>
+            </a:extLst>
+          </p:cNvPr>
+          <p:cNvSpPr txBox="1"/>
+          <p:nvPr/>
+        </p:nvSpPr>
+        <p:spPr>
+          <a:xfrm>
+            <a:off x="7229251" y="1946776"/>
+            <a:ext cx="344966" cy="276999"/>
+          </a:xfrm>
+          <a:prstGeom prst="rect">
+            <a:avLst/>
+          </a:prstGeom>
+          <a:noFill/>
+        </p:spPr>
+        <p:txBody>
+          <a:bodyPr wrap="none" rtlCol="0">
+            <a:spAutoFit/>
+          </a:bodyPr>
+          <a:lstStyle/>
+          <a:p>
+            <a:r>
+              <a:rPr lang="en-US" sz="1200" dirty="0"/>
+              <a:t>C0</a:t>
+            </a:r>
+            <a:endParaRPr lang="en-GB" sz="1200" dirty="0"/>
+          </a:p>
+        </p:txBody>
+      </p:sp>
+      <p:sp>
+        <p:nvSpPr>
+          <p:cNvPr id="15" name="TextBox 14">
+            <a:extLst>
+              <a:ext uri="{FF2B5EF4-FFF2-40B4-BE49-F238E27FC236}">
+                <a16:creationId xmlns:a16="http://schemas.microsoft.com/office/drawing/2014/main" id="{3818ED69-B331-B6F7-E10A-3856AF6B36A6}"/>
+              </a:ext>
+            </a:extLst>
+          </p:cNvPr>
+          <p:cNvSpPr txBox="1"/>
+          <p:nvPr/>
+        </p:nvSpPr>
+        <p:spPr>
+          <a:xfrm>
+            <a:off x="7229251" y="2260427"/>
+            <a:ext cx="344966" cy="276999"/>
+          </a:xfrm>
+          <a:prstGeom prst="rect">
+            <a:avLst/>
+          </a:prstGeom>
+          <a:noFill/>
+        </p:spPr>
+        <p:txBody>
+          <a:bodyPr wrap="none" rtlCol="0">
+            <a:spAutoFit/>
+          </a:bodyPr>
+          <a:lstStyle/>
+          <a:p>
+            <a:r>
+              <a:rPr lang="en-US" sz="1200" dirty="0"/>
+              <a:t>C1</a:t>
             </a:r>
             <a:endParaRPr lang="en-GB" sz="1200" dirty="0"/>
           </a:p>

</xml_diff>

<commit_message>
improved SSS_detector detection rate when large phase offsets are present
</commit_message>
<xml_diff>
--- a/doc/overview.pptx
+++ b/doc/overview.pptx
@@ -261,7 +261,7 @@
           <a:p>
             <a:fld id="{0647E4D3-4269-40FF-ADD2-F433546F1734}" type="datetimeFigureOut">
               <a:rPr lang="en-GB" smtClean="0"/>
-              <a:t>23/02/2023</a:t>
+              <a:t>25/02/2023</a:t>
             </a:fld>
             <a:endParaRPr lang="en-GB"/>
           </a:p>
@@ -315,7 +315,7 @@
           <a:p>
             <a:fld id="{1991B810-A44B-42D8-B2B0-10522A071A3E}" type="slidenum">
               <a:rPr lang="en-GB" smtClean="0"/>
-              <a:t>‹#›</a:t>
+              <a:t>‹Nr.›</a:t>
             </a:fld>
             <a:endParaRPr lang="en-GB"/>
           </a:p>
@@ -461,7 +461,7 @@
           <a:p>
             <a:fld id="{0647E4D3-4269-40FF-ADD2-F433546F1734}" type="datetimeFigureOut">
               <a:rPr lang="en-GB" smtClean="0"/>
-              <a:t>23/02/2023</a:t>
+              <a:t>25/02/2023</a:t>
             </a:fld>
             <a:endParaRPr lang="en-GB"/>
           </a:p>
@@ -515,7 +515,7 @@
           <a:p>
             <a:fld id="{1991B810-A44B-42D8-B2B0-10522A071A3E}" type="slidenum">
               <a:rPr lang="en-GB" smtClean="0"/>
-              <a:t>‹#›</a:t>
+              <a:t>‹Nr.›</a:t>
             </a:fld>
             <a:endParaRPr lang="en-GB"/>
           </a:p>
@@ -671,7 +671,7 @@
           <a:p>
             <a:fld id="{0647E4D3-4269-40FF-ADD2-F433546F1734}" type="datetimeFigureOut">
               <a:rPr lang="en-GB" smtClean="0"/>
-              <a:t>23/02/2023</a:t>
+              <a:t>25/02/2023</a:t>
             </a:fld>
             <a:endParaRPr lang="en-GB"/>
           </a:p>
@@ -725,7 +725,7 @@
           <a:p>
             <a:fld id="{1991B810-A44B-42D8-B2B0-10522A071A3E}" type="slidenum">
               <a:rPr lang="en-GB" smtClean="0"/>
-              <a:t>‹#›</a:t>
+              <a:t>‹Nr.›</a:t>
             </a:fld>
             <a:endParaRPr lang="en-GB"/>
           </a:p>
@@ -871,7 +871,7 @@
           <a:p>
             <a:fld id="{0647E4D3-4269-40FF-ADD2-F433546F1734}" type="datetimeFigureOut">
               <a:rPr lang="en-GB" smtClean="0"/>
-              <a:t>23/02/2023</a:t>
+              <a:t>25/02/2023</a:t>
             </a:fld>
             <a:endParaRPr lang="en-GB"/>
           </a:p>
@@ -925,7 +925,7 @@
           <a:p>
             <a:fld id="{1991B810-A44B-42D8-B2B0-10522A071A3E}" type="slidenum">
               <a:rPr lang="en-GB" smtClean="0"/>
-              <a:t>‹#›</a:t>
+              <a:t>‹Nr.›</a:t>
             </a:fld>
             <a:endParaRPr lang="en-GB"/>
           </a:p>
@@ -1147,7 +1147,7 @@
           <a:p>
             <a:fld id="{0647E4D3-4269-40FF-ADD2-F433546F1734}" type="datetimeFigureOut">
               <a:rPr lang="en-GB" smtClean="0"/>
-              <a:t>23/02/2023</a:t>
+              <a:t>25/02/2023</a:t>
             </a:fld>
             <a:endParaRPr lang="en-GB"/>
           </a:p>
@@ -1201,7 +1201,7 @@
           <a:p>
             <a:fld id="{1991B810-A44B-42D8-B2B0-10522A071A3E}" type="slidenum">
               <a:rPr lang="en-GB" smtClean="0"/>
-              <a:t>‹#›</a:t>
+              <a:t>‹Nr.›</a:t>
             </a:fld>
             <a:endParaRPr lang="en-GB"/>
           </a:p>
@@ -1415,7 +1415,7 @@
           <a:p>
             <a:fld id="{0647E4D3-4269-40FF-ADD2-F433546F1734}" type="datetimeFigureOut">
               <a:rPr lang="en-GB" smtClean="0"/>
-              <a:t>23/02/2023</a:t>
+              <a:t>25/02/2023</a:t>
             </a:fld>
             <a:endParaRPr lang="en-GB"/>
           </a:p>
@@ -1469,7 +1469,7 @@
           <a:p>
             <a:fld id="{1991B810-A44B-42D8-B2B0-10522A071A3E}" type="slidenum">
               <a:rPr lang="en-GB" smtClean="0"/>
-              <a:t>‹#›</a:t>
+              <a:t>‹Nr.›</a:t>
             </a:fld>
             <a:endParaRPr lang="en-GB"/>
           </a:p>
@@ -1830,7 +1830,7 @@
           <a:p>
             <a:fld id="{0647E4D3-4269-40FF-ADD2-F433546F1734}" type="datetimeFigureOut">
               <a:rPr lang="en-GB" smtClean="0"/>
-              <a:t>23/02/2023</a:t>
+              <a:t>25/02/2023</a:t>
             </a:fld>
             <a:endParaRPr lang="en-GB"/>
           </a:p>
@@ -1884,7 +1884,7 @@
           <a:p>
             <a:fld id="{1991B810-A44B-42D8-B2B0-10522A071A3E}" type="slidenum">
               <a:rPr lang="en-GB" smtClean="0"/>
-              <a:t>‹#›</a:t>
+              <a:t>‹Nr.›</a:t>
             </a:fld>
             <a:endParaRPr lang="en-GB"/>
           </a:p>
@@ -1972,7 +1972,7 @@
           <a:p>
             <a:fld id="{0647E4D3-4269-40FF-ADD2-F433546F1734}" type="datetimeFigureOut">
               <a:rPr lang="en-GB" smtClean="0"/>
-              <a:t>23/02/2023</a:t>
+              <a:t>25/02/2023</a:t>
             </a:fld>
             <a:endParaRPr lang="en-GB"/>
           </a:p>
@@ -2026,7 +2026,7 @@
           <a:p>
             <a:fld id="{1991B810-A44B-42D8-B2B0-10522A071A3E}" type="slidenum">
               <a:rPr lang="en-GB" smtClean="0"/>
-              <a:t>‹#›</a:t>
+              <a:t>‹Nr.›</a:t>
             </a:fld>
             <a:endParaRPr lang="en-GB"/>
           </a:p>
@@ -2085,7 +2085,7 @@
           <a:p>
             <a:fld id="{0647E4D3-4269-40FF-ADD2-F433546F1734}" type="datetimeFigureOut">
               <a:rPr lang="en-GB" smtClean="0"/>
-              <a:t>23/02/2023</a:t>
+              <a:t>25/02/2023</a:t>
             </a:fld>
             <a:endParaRPr lang="en-GB"/>
           </a:p>
@@ -2139,7 +2139,7 @@
           <a:p>
             <a:fld id="{1991B810-A44B-42D8-B2B0-10522A071A3E}" type="slidenum">
               <a:rPr lang="en-GB" smtClean="0"/>
-              <a:t>‹#›</a:t>
+              <a:t>‹Nr.›</a:t>
             </a:fld>
             <a:endParaRPr lang="en-GB"/>
           </a:p>
@@ -2398,7 +2398,7 @@
           <a:p>
             <a:fld id="{0647E4D3-4269-40FF-ADD2-F433546F1734}" type="datetimeFigureOut">
               <a:rPr lang="en-GB" smtClean="0"/>
-              <a:t>23/02/2023</a:t>
+              <a:t>25/02/2023</a:t>
             </a:fld>
             <a:endParaRPr lang="en-GB"/>
           </a:p>
@@ -2452,7 +2452,7 @@
           <a:p>
             <a:fld id="{1991B810-A44B-42D8-B2B0-10522A071A3E}" type="slidenum">
               <a:rPr lang="en-GB" smtClean="0"/>
-              <a:t>‹#›</a:t>
+              <a:t>‹Nr.›</a:t>
             </a:fld>
             <a:endParaRPr lang="en-GB"/>
           </a:p>
@@ -2687,7 +2687,7 @@
           <a:p>
             <a:fld id="{0647E4D3-4269-40FF-ADD2-F433546F1734}" type="datetimeFigureOut">
               <a:rPr lang="en-GB" smtClean="0"/>
-              <a:t>23/02/2023</a:t>
+              <a:t>25/02/2023</a:t>
             </a:fld>
             <a:endParaRPr lang="en-GB"/>
           </a:p>
@@ -2741,7 +2741,7 @@
           <a:p>
             <a:fld id="{1991B810-A44B-42D8-B2B0-10522A071A3E}" type="slidenum">
               <a:rPr lang="en-GB" smtClean="0"/>
-              <a:t>‹#›</a:t>
+              <a:t>‹Nr.›</a:t>
             </a:fld>
             <a:endParaRPr lang="en-GB"/>
           </a:p>
@@ -2930,7 +2930,7 @@
           <a:p>
             <a:fld id="{0647E4D3-4269-40FF-ADD2-F433546F1734}" type="datetimeFigureOut">
               <a:rPr lang="en-GB" smtClean="0"/>
-              <a:t>23/02/2023</a:t>
+              <a:t>25/02/2023</a:t>
             </a:fld>
             <a:endParaRPr lang="en-GB"/>
           </a:p>
@@ -3020,7 +3020,7 @@
           <a:p>
             <a:fld id="{1991B810-A44B-42D8-B2B0-10522A071A3E}" type="slidenum">
               <a:rPr lang="en-GB" smtClean="0"/>
-              <a:t>‹#›</a:t>
+              <a:t>‹Nr.›</a:t>
             </a:fld>
             <a:endParaRPr lang="en-GB"/>
           </a:p>
@@ -7200,8 +7200,8 @@
           </a:fontRef>
         </p:style>
       </p:cxnSp>
-      <mc:AlternateContent xmlns:mc="http://schemas.openxmlformats.org/markup-compatibility/2006">
-        <mc:Choice xmlns:a14="http://schemas.microsoft.com/office/drawing/2010/main" Requires="a14">
+      <mc:AlternateContent xmlns:mc="http://schemas.openxmlformats.org/markup-compatibility/2006" xmlns:a14="http://schemas.microsoft.com/office/drawing/2010/main">
+        <mc:Choice Requires="a14">
           <p:sp>
             <p:nvSpPr>
               <p:cNvPr id="73" name="TextBox 61">
@@ -7282,7 +7282,7 @@
             </p:txBody>
           </p:sp>
         </mc:Choice>
-        <mc:Fallback>
+        <mc:Fallback xmlns="">
           <p:sp>
             <p:nvSpPr>
               <p:cNvPr id="73" name="TextBox 61">
@@ -8661,8 +8661,8 @@
         </p:nvSpPr>
         <p:spPr>
           <a:xfrm>
-            <a:off x="9943538" y="4797932"/>
-            <a:ext cx="711122" cy="245423"/>
+            <a:off x="9942606" y="4797932"/>
+            <a:ext cx="712054" cy="245423"/>
           </a:xfrm>
           <a:prstGeom prst="rect">
             <a:avLst/>
@@ -9099,6 +9099,70 @@
                   </a:schemeClr>
                 </a:outerShdw>
               </a:effectLst>
+            </a:endParaRPr>
+          </a:p>
+        </p:txBody>
+      </p:sp>
+      <p:sp>
+        <p:nvSpPr>
+          <p:cNvPr id="45" name="Rechteck 111">
+            <a:extLst>
+              <a:ext uri="{FF2B5EF4-FFF2-40B4-BE49-F238E27FC236}">
+                <a16:creationId xmlns:a16="http://schemas.microsoft.com/office/drawing/2014/main" id="{E9DB22C0-CFFE-0BE9-0495-7A68AFF394D7}"/>
+              </a:ext>
+            </a:extLst>
+          </p:cNvPr>
+          <p:cNvSpPr/>
+          <p:nvPr/>
+        </p:nvSpPr>
+        <p:spPr>
+          <a:xfrm>
+            <a:off x="6457664" y="5351995"/>
+            <a:ext cx="712054" cy="245423"/>
+          </a:xfrm>
+          <a:prstGeom prst="rect">
+            <a:avLst/>
+          </a:prstGeom>
+          <a:solidFill>
+            <a:schemeClr val="accent6">
+              <a:lumMod val="60000"/>
+              <a:lumOff val="40000"/>
+            </a:schemeClr>
+          </a:solidFill>
+        </p:spPr>
+        <p:style>
+          <a:lnRef idx="2">
+            <a:schemeClr val="accent1">
+              <a:shade val="50000"/>
+            </a:schemeClr>
+          </a:lnRef>
+          <a:fillRef idx="1">
+            <a:schemeClr val="accent1"/>
+          </a:fillRef>
+          <a:effectRef idx="0">
+            <a:schemeClr val="accent1"/>
+          </a:effectRef>
+          <a:fontRef idx="minor">
+            <a:schemeClr val="lt1"/>
+          </a:fontRef>
+        </p:style>
+        <p:txBody>
+          <a:bodyPr rtlCol="0" anchor="ctr"/>
+          <a:lstStyle/>
+          <a:p>
+            <a:pPr algn="ctr"/>
+            <a:r>
+              <a:rPr lang="en-US" sz="1400" dirty="0">
+                <a:solidFill>
+                  <a:schemeClr val="bg1"/>
+                </a:solidFill>
+              </a:rPr>
+              <a:t>AXI lite</a:t>
+            </a:r>
+            <a:endParaRPr lang="de-DE" sz="1400" dirty="0">
+              <a:solidFill>
+                <a:schemeClr val="bg1"/>
+              </a:solidFill>
             </a:endParaRPr>
           </a:p>
         </p:txBody>

</xml_diff>

<commit_message>
update overview diagram with ressource grid subscriber
</commit_message>
<xml_diff>
--- a/doc/overview.pptx
+++ b/doc/overview.pptx
@@ -261,7 +261,7 @@
           <a:p>
             <a:fld id="{0647E4D3-4269-40FF-ADD2-F433546F1734}" type="datetimeFigureOut">
               <a:rPr lang="en-GB" smtClean="0"/>
-              <a:t>03/03/2023</a:t>
+              <a:t>04/03/2023</a:t>
             </a:fld>
             <a:endParaRPr lang="en-GB"/>
           </a:p>
@@ -315,7 +315,7 @@
           <a:p>
             <a:fld id="{1991B810-A44B-42D8-B2B0-10522A071A3E}" type="slidenum">
               <a:rPr lang="en-GB" smtClean="0"/>
-              <a:t>‹#›</a:t>
+              <a:t>‹Nr.›</a:t>
             </a:fld>
             <a:endParaRPr lang="en-GB"/>
           </a:p>
@@ -461,7 +461,7 @@
           <a:p>
             <a:fld id="{0647E4D3-4269-40FF-ADD2-F433546F1734}" type="datetimeFigureOut">
               <a:rPr lang="en-GB" smtClean="0"/>
-              <a:t>03/03/2023</a:t>
+              <a:t>04/03/2023</a:t>
             </a:fld>
             <a:endParaRPr lang="en-GB"/>
           </a:p>
@@ -515,7 +515,7 @@
           <a:p>
             <a:fld id="{1991B810-A44B-42D8-B2B0-10522A071A3E}" type="slidenum">
               <a:rPr lang="en-GB" smtClean="0"/>
-              <a:t>‹#›</a:t>
+              <a:t>‹Nr.›</a:t>
             </a:fld>
             <a:endParaRPr lang="en-GB"/>
           </a:p>
@@ -671,7 +671,7 @@
           <a:p>
             <a:fld id="{0647E4D3-4269-40FF-ADD2-F433546F1734}" type="datetimeFigureOut">
               <a:rPr lang="en-GB" smtClean="0"/>
-              <a:t>03/03/2023</a:t>
+              <a:t>04/03/2023</a:t>
             </a:fld>
             <a:endParaRPr lang="en-GB"/>
           </a:p>
@@ -725,7 +725,7 @@
           <a:p>
             <a:fld id="{1991B810-A44B-42D8-B2B0-10522A071A3E}" type="slidenum">
               <a:rPr lang="en-GB" smtClean="0"/>
-              <a:t>‹#›</a:t>
+              <a:t>‹Nr.›</a:t>
             </a:fld>
             <a:endParaRPr lang="en-GB"/>
           </a:p>
@@ -871,7 +871,7 @@
           <a:p>
             <a:fld id="{0647E4D3-4269-40FF-ADD2-F433546F1734}" type="datetimeFigureOut">
               <a:rPr lang="en-GB" smtClean="0"/>
-              <a:t>03/03/2023</a:t>
+              <a:t>04/03/2023</a:t>
             </a:fld>
             <a:endParaRPr lang="en-GB"/>
           </a:p>
@@ -925,7 +925,7 @@
           <a:p>
             <a:fld id="{1991B810-A44B-42D8-B2B0-10522A071A3E}" type="slidenum">
               <a:rPr lang="en-GB" smtClean="0"/>
-              <a:t>‹#›</a:t>
+              <a:t>‹Nr.›</a:t>
             </a:fld>
             <a:endParaRPr lang="en-GB"/>
           </a:p>
@@ -1147,7 +1147,7 @@
           <a:p>
             <a:fld id="{0647E4D3-4269-40FF-ADD2-F433546F1734}" type="datetimeFigureOut">
               <a:rPr lang="en-GB" smtClean="0"/>
-              <a:t>03/03/2023</a:t>
+              <a:t>04/03/2023</a:t>
             </a:fld>
             <a:endParaRPr lang="en-GB"/>
           </a:p>
@@ -1201,7 +1201,7 @@
           <a:p>
             <a:fld id="{1991B810-A44B-42D8-B2B0-10522A071A3E}" type="slidenum">
               <a:rPr lang="en-GB" smtClean="0"/>
-              <a:t>‹#›</a:t>
+              <a:t>‹Nr.›</a:t>
             </a:fld>
             <a:endParaRPr lang="en-GB"/>
           </a:p>
@@ -1415,7 +1415,7 @@
           <a:p>
             <a:fld id="{0647E4D3-4269-40FF-ADD2-F433546F1734}" type="datetimeFigureOut">
               <a:rPr lang="en-GB" smtClean="0"/>
-              <a:t>03/03/2023</a:t>
+              <a:t>04/03/2023</a:t>
             </a:fld>
             <a:endParaRPr lang="en-GB"/>
           </a:p>
@@ -1469,7 +1469,7 @@
           <a:p>
             <a:fld id="{1991B810-A44B-42D8-B2B0-10522A071A3E}" type="slidenum">
               <a:rPr lang="en-GB" smtClean="0"/>
-              <a:t>‹#›</a:t>
+              <a:t>‹Nr.›</a:t>
             </a:fld>
             <a:endParaRPr lang="en-GB"/>
           </a:p>
@@ -1830,7 +1830,7 @@
           <a:p>
             <a:fld id="{0647E4D3-4269-40FF-ADD2-F433546F1734}" type="datetimeFigureOut">
               <a:rPr lang="en-GB" smtClean="0"/>
-              <a:t>03/03/2023</a:t>
+              <a:t>04/03/2023</a:t>
             </a:fld>
             <a:endParaRPr lang="en-GB"/>
           </a:p>
@@ -1884,7 +1884,7 @@
           <a:p>
             <a:fld id="{1991B810-A44B-42D8-B2B0-10522A071A3E}" type="slidenum">
               <a:rPr lang="en-GB" smtClean="0"/>
-              <a:t>‹#›</a:t>
+              <a:t>‹Nr.›</a:t>
             </a:fld>
             <a:endParaRPr lang="en-GB"/>
           </a:p>
@@ -1972,7 +1972,7 @@
           <a:p>
             <a:fld id="{0647E4D3-4269-40FF-ADD2-F433546F1734}" type="datetimeFigureOut">
               <a:rPr lang="en-GB" smtClean="0"/>
-              <a:t>03/03/2023</a:t>
+              <a:t>04/03/2023</a:t>
             </a:fld>
             <a:endParaRPr lang="en-GB"/>
           </a:p>
@@ -2026,7 +2026,7 @@
           <a:p>
             <a:fld id="{1991B810-A44B-42D8-B2B0-10522A071A3E}" type="slidenum">
               <a:rPr lang="en-GB" smtClean="0"/>
-              <a:t>‹#›</a:t>
+              <a:t>‹Nr.›</a:t>
             </a:fld>
             <a:endParaRPr lang="en-GB"/>
           </a:p>
@@ -2085,7 +2085,7 @@
           <a:p>
             <a:fld id="{0647E4D3-4269-40FF-ADD2-F433546F1734}" type="datetimeFigureOut">
               <a:rPr lang="en-GB" smtClean="0"/>
-              <a:t>03/03/2023</a:t>
+              <a:t>04/03/2023</a:t>
             </a:fld>
             <a:endParaRPr lang="en-GB"/>
           </a:p>
@@ -2139,7 +2139,7 @@
           <a:p>
             <a:fld id="{1991B810-A44B-42D8-B2B0-10522A071A3E}" type="slidenum">
               <a:rPr lang="en-GB" smtClean="0"/>
-              <a:t>‹#›</a:t>
+              <a:t>‹Nr.›</a:t>
             </a:fld>
             <a:endParaRPr lang="en-GB"/>
           </a:p>
@@ -2398,7 +2398,7 @@
           <a:p>
             <a:fld id="{0647E4D3-4269-40FF-ADD2-F433546F1734}" type="datetimeFigureOut">
               <a:rPr lang="en-GB" smtClean="0"/>
-              <a:t>03/03/2023</a:t>
+              <a:t>04/03/2023</a:t>
             </a:fld>
             <a:endParaRPr lang="en-GB"/>
           </a:p>
@@ -2452,7 +2452,7 @@
           <a:p>
             <a:fld id="{1991B810-A44B-42D8-B2B0-10522A071A3E}" type="slidenum">
               <a:rPr lang="en-GB" smtClean="0"/>
-              <a:t>‹#›</a:t>
+              <a:t>‹Nr.›</a:t>
             </a:fld>
             <a:endParaRPr lang="en-GB"/>
           </a:p>
@@ -2687,7 +2687,7 @@
           <a:p>
             <a:fld id="{0647E4D3-4269-40FF-ADD2-F433546F1734}" type="datetimeFigureOut">
               <a:rPr lang="en-GB" smtClean="0"/>
-              <a:t>03/03/2023</a:t>
+              <a:t>04/03/2023</a:t>
             </a:fld>
             <a:endParaRPr lang="en-GB"/>
           </a:p>
@@ -2741,7 +2741,7 @@
           <a:p>
             <a:fld id="{1991B810-A44B-42D8-B2B0-10522A071A3E}" type="slidenum">
               <a:rPr lang="en-GB" smtClean="0"/>
-              <a:t>‹#›</a:t>
+              <a:t>‹Nr.›</a:t>
             </a:fld>
             <a:endParaRPr lang="en-GB"/>
           </a:p>
@@ -2930,7 +2930,7 @@
           <a:p>
             <a:fld id="{0647E4D3-4269-40FF-ADD2-F433546F1734}" type="datetimeFigureOut">
               <a:rPr lang="en-GB" smtClean="0"/>
-              <a:t>03/03/2023</a:t>
+              <a:t>04/03/2023</a:t>
             </a:fld>
             <a:endParaRPr lang="en-GB"/>
           </a:p>
@@ -3020,7 +3020,7 @@
           <a:p>
             <a:fld id="{1991B810-A44B-42D8-B2B0-10522A071A3E}" type="slidenum">
               <a:rPr lang="en-GB" smtClean="0"/>
-              <a:t>‹#›</a:t>
+              <a:t>‹Nr.›</a:t>
             </a:fld>
             <a:endParaRPr lang="en-GB"/>
           </a:p>
@@ -8180,6 +8180,353 @@
           </a:p>
         </p:txBody>
       </p:sp>
+      <p:sp>
+        <p:nvSpPr>
+          <p:cNvPr id="59" name="Rectangle 8">
+            <a:extLst>
+              <a:ext uri="{FF2B5EF4-FFF2-40B4-BE49-F238E27FC236}">
+                <a16:creationId xmlns:a16="http://schemas.microsoft.com/office/drawing/2014/main" id="{8102D6FA-C890-3410-CE30-F9F67F26FC87}"/>
+              </a:ext>
+            </a:extLst>
+          </p:cNvPr>
+          <p:cNvSpPr/>
+          <p:nvPr/>
+        </p:nvSpPr>
+        <p:spPr>
+          <a:xfrm>
+            <a:off x="8474380" y="3537123"/>
+            <a:ext cx="1151541" cy="1206137"/>
+          </a:xfrm>
+          <a:prstGeom prst="rect">
+            <a:avLst/>
+          </a:prstGeom>
+          <a:solidFill>
+            <a:schemeClr val="bg1"/>
+          </a:solidFill>
+        </p:spPr>
+        <p:style>
+          <a:lnRef idx="2">
+            <a:schemeClr val="accent1">
+              <a:shade val="50000"/>
+            </a:schemeClr>
+          </a:lnRef>
+          <a:fillRef idx="1">
+            <a:schemeClr val="accent1"/>
+          </a:fillRef>
+          <a:effectRef idx="0">
+            <a:schemeClr val="accent1"/>
+          </a:effectRef>
+          <a:fontRef idx="minor">
+            <a:schemeClr val="lt1"/>
+          </a:fontRef>
+        </p:style>
+        <p:txBody>
+          <a:bodyPr rtlCol="0" anchor="ctr"/>
+          <a:lstStyle/>
+          <a:p>
+            <a:pPr algn="ctr"/>
+            <a:r>
+              <a:rPr lang="en-US">
+                <a:ln w="0"/>
+                <a:solidFill>
+                  <a:schemeClr val="tx1"/>
+                </a:solidFill>
+                <a:effectLst>
+                  <a:outerShdw blurRad="38100" dist="19050" dir="2700000" algn="tl" rotWithShape="0">
+                    <a:schemeClr val="dk1">
+                      <a:alpha val="40000"/>
+                    </a:schemeClr>
+                  </a:outerShdw>
+                </a:effectLst>
+              </a:rPr>
+              <a:t>resource grid subscriber</a:t>
+            </a:r>
+            <a:endParaRPr lang="en-GB" dirty="0">
+              <a:ln w="0"/>
+              <a:solidFill>
+                <a:schemeClr val="tx1"/>
+              </a:solidFill>
+              <a:effectLst>
+                <a:outerShdw blurRad="38100" dist="19050" dir="2700000" algn="tl" rotWithShape="0">
+                  <a:schemeClr val="dk1">
+                    <a:alpha val="40000"/>
+                  </a:schemeClr>
+                </a:outerShdw>
+              </a:effectLst>
+            </a:endParaRPr>
+          </a:p>
+        </p:txBody>
+      </p:sp>
+      <p:cxnSp>
+        <p:nvCxnSpPr>
+          <p:cNvPr id="66" name="Straight Arrow Connector 40">
+            <a:extLst>
+              <a:ext uri="{FF2B5EF4-FFF2-40B4-BE49-F238E27FC236}">
+                <a16:creationId xmlns:a16="http://schemas.microsoft.com/office/drawing/2014/main" id="{5A38EAD6-4871-5894-DEEC-6405721AD63D}"/>
+              </a:ext>
+            </a:extLst>
+          </p:cNvPr>
+          <p:cNvCxnSpPr>
+            <a:cxnSpLocks/>
+          </p:cNvCxnSpPr>
+          <p:nvPr/>
+        </p:nvCxnSpPr>
+        <p:spPr>
+          <a:xfrm>
+            <a:off x="7987917" y="4386563"/>
+            <a:ext cx="486463" cy="0"/>
+          </a:xfrm>
+          <a:prstGeom prst="straightConnector1">
+            <a:avLst/>
+          </a:prstGeom>
+          <a:ln w="19050">
+            <a:tailEnd type="triangle"/>
+          </a:ln>
+        </p:spPr>
+        <p:style>
+          <a:lnRef idx="1">
+            <a:schemeClr val="accent1"/>
+          </a:lnRef>
+          <a:fillRef idx="0">
+            <a:schemeClr val="accent1"/>
+          </a:fillRef>
+          <a:effectRef idx="0">
+            <a:schemeClr val="accent1"/>
+          </a:effectRef>
+          <a:fontRef idx="minor">
+            <a:schemeClr val="tx1"/>
+          </a:fontRef>
+        </p:style>
+      </p:cxnSp>
+      <p:cxnSp>
+        <p:nvCxnSpPr>
+          <p:cNvPr id="72" name="Straight Connector 42">
+            <a:extLst>
+              <a:ext uri="{FF2B5EF4-FFF2-40B4-BE49-F238E27FC236}">
+                <a16:creationId xmlns:a16="http://schemas.microsoft.com/office/drawing/2014/main" id="{7FDEC6F5-B950-CB91-35E5-AF1F766F05F0}"/>
+              </a:ext>
+            </a:extLst>
+          </p:cNvPr>
+          <p:cNvCxnSpPr>
+            <a:cxnSpLocks/>
+          </p:cNvCxnSpPr>
+          <p:nvPr/>
+        </p:nvCxnSpPr>
+        <p:spPr>
+          <a:xfrm>
+            <a:off x="6409508" y="4868675"/>
+            <a:ext cx="1578409" cy="0"/>
+          </a:xfrm>
+          <a:prstGeom prst="line">
+            <a:avLst/>
+          </a:prstGeom>
+          <a:ln w="19050"/>
+        </p:spPr>
+        <p:style>
+          <a:lnRef idx="1">
+            <a:schemeClr val="accent1"/>
+          </a:lnRef>
+          <a:fillRef idx="0">
+            <a:schemeClr val="accent1"/>
+          </a:fillRef>
+          <a:effectRef idx="0">
+            <a:schemeClr val="accent1"/>
+          </a:effectRef>
+          <a:fontRef idx="minor">
+            <a:schemeClr val="tx1"/>
+          </a:fontRef>
+        </p:style>
+      </p:cxnSp>
+      <p:sp>
+        <p:nvSpPr>
+          <p:cNvPr id="81" name="Rechteck 111">
+            <a:extLst>
+              <a:ext uri="{FF2B5EF4-FFF2-40B4-BE49-F238E27FC236}">
+                <a16:creationId xmlns:a16="http://schemas.microsoft.com/office/drawing/2014/main" id="{E13E4B61-4B7A-8E24-ED7B-45E09A56B9CF}"/>
+              </a:ext>
+            </a:extLst>
+          </p:cNvPr>
+          <p:cNvSpPr/>
+          <p:nvPr/>
+        </p:nvSpPr>
+        <p:spPr>
+          <a:xfrm>
+            <a:off x="9456518" y="3597349"/>
+            <a:ext cx="711122" cy="245423"/>
+          </a:xfrm>
+          <a:prstGeom prst="rect">
+            <a:avLst/>
+          </a:prstGeom>
+          <a:solidFill>
+            <a:schemeClr val="accent6">
+              <a:lumMod val="60000"/>
+              <a:lumOff val="40000"/>
+            </a:schemeClr>
+          </a:solidFill>
+        </p:spPr>
+        <p:style>
+          <a:lnRef idx="2">
+            <a:schemeClr val="accent1">
+              <a:shade val="50000"/>
+            </a:schemeClr>
+          </a:lnRef>
+          <a:fillRef idx="1">
+            <a:schemeClr val="accent1"/>
+          </a:fillRef>
+          <a:effectRef idx="0">
+            <a:schemeClr val="accent1"/>
+          </a:effectRef>
+          <a:fontRef idx="minor">
+            <a:schemeClr val="lt1"/>
+          </a:fontRef>
+        </p:style>
+        <p:txBody>
+          <a:bodyPr rtlCol="0" anchor="ctr"/>
+          <a:lstStyle/>
+          <a:p>
+            <a:pPr algn="ctr"/>
+            <a:r>
+              <a:rPr lang="en-US" sz="1400" dirty="0">
+                <a:solidFill>
+                  <a:schemeClr val="bg1"/>
+                </a:solidFill>
+              </a:rPr>
+              <a:t>AXI lite</a:t>
+            </a:r>
+            <a:endParaRPr lang="de-DE" sz="1400" dirty="0">
+              <a:solidFill>
+                <a:schemeClr val="bg1"/>
+              </a:solidFill>
+            </a:endParaRPr>
+          </a:p>
+        </p:txBody>
+      </p:sp>
+      <p:cxnSp>
+        <p:nvCxnSpPr>
+          <p:cNvPr id="82" name="Straight Arrow Connector 60">
+            <a:extLst>
+              <a:ext uri="{FF2B5EF4-FFF2-40B4-BE49-F238E27FC236}">
+                <a16:creationId xmlns:a16="http://schemas.microsoft.com/office/drawing/2014/main" id="{73BF56A3-867C-0549-4F85-8AC4FA6D43C5}"/>
+              </a:ext>
+            </a:extLst>
+          </p:cNvPr>
+          <p:cNvCxnSpPr>
+            <a:cxnSpLocks/>
+          </p:cNvCxnSpPr>
+          <p:nvPr/>
+        </p:nvCxnSpPr>
+        <p:spPr>
+          <a:xfrm flipV="1">
+            <a:off x="10890311" y="3734452"/>
+            <a:ext cx="0" cy="427201"/>
+          </a:xfrm>
+          <a:prstGeom prst="straightConnector1">
+            <a:avLst/>
+          </a:prstGeom>
+          <a:ln w="19050">
+            <a:solidFill>
+              <a:schemeClr val="tx1"/>
+            </a:solidFill>
+            <a:tailEnd type="triangle"/>
+          </a:ln>
+        </p:spPr>
+        <p:style>
+          <a:lnRef idx="1">
+            <a:schemeClr val="accent1"/>
+          </a:lnRef>
+          <a:fillRef idx="0">
+            <a:schemeClr val="accent1"/>
+          </a:fillRef>
+          <a:effectRef idx="0">
+            <a:schemeClr val="accent1"/>
+          </a:effectRef>
+          <a:fontRef idx="minor">
+            <a:schemeClr val="tx1"/>
+          </a:fontRef>
+        </p:style>
+      </p:cxnSp>
+      <p:cxnSp>
+        <p:nvCxnSpPr>
+          <p:cNvPr id="87" name="Straight Connector 23">
+            <a:extLst>
+              <a:ext uri="{FF2B5EF4-FFF2-40B4-BE49-F238E27FC236}">
+                <a16:creationId xmlns:a16="http://schemas.microsoft.com/office/drawing/2014/main" id="{CEEC669A-5BDF-1731-3065-899FC4DE2CD3}"/>
+              </a:ext>
+            </a:extLst>
+          </p:cNvPr>
+          <p:cNvCxnSpPr>
+            <a:cxnSpLocks/>
+          </p:cNvCxnSpPr>
+          <p:nvPr/>
+        </p:nvCxnSpPr>
+        <p:spPr>
+          <a:xfrm flipV="1">
+            <a:off x="9625921" y="4161653"/>
+            <a:ext cx="1264390" cy="6088"/>
+          </a:xfrm>
+          <a:prstGeom prst="line">
+            <a:avLst/>
+          </a:prstGeom>
+          <a:ln w="19050">
+            <a:solidFill>
+              <a:schemeClr val="tx1"/>
+            </a:solidFill>
+          </a:ln>
+        </p:spPr>
+        <p:style>
+          <a:lnRef idx="1">
+            <a:schemeClr val="accent1"/>
+          </a:lnRef>
+          <a:fillRef idx="0">
+            <a:schemeClr val="accent1"/>
+          </a:fillRef>
+          <a:effectRef idx="0">
+            <a:schemeClr val="accent1"/>
+          </a:effectRef>
+          <a:fontRef idx="minor">
+            <a:schemeClr val="tx1"/>
+          </a:fontRef>
+        </p:style>
+      </p:cxnSp>
+      <p:cxnSp>
+        <p:nvCxnSpPr>
+          <p:cNvPr id="93" name="Straight Connector 42">
+            <a:extLst>
+              <a:ext uri="{FF2B5EF4-FFF2-40B4-BE49-F238E27FC236}">
+                <a16:creationId xmlns:a16="http://schemas.microsoft.com/office/drawing/2014/main" id="{28B12D27-2F1E-7944-B92A-AFD269E0A26D}"/>
+              </a:ext>
+            </a:extLst>
+          </p:cNvPr>
+          <p:cNvCxnSpPr>
+            <a:cxnSpLocks/>
+          </p:cNvCxnSpPr>
+          <p:nvPr/>
+        </p:nvCxnSpPr>
+        <p:spPr>
+          <a:xfrm flipV="1">
+            <a:off x="7987917" y="4386563"/>
+            <a:ext cx="0" cy="482112"/>
+          </a:xfrm>
+          <a:prstGeom prst="line">
+            <a:avLst/>
+          </a:prstGeom>
+          <a:ln w="19050"/>
+        </p:spPr>
+        <p:style>
+          <a:lnRef idx="1">
+            <a:schemeClr val="accent1"/>
+          </a:lnRef>
+          <a:fillRef idx="0">
+            <a:schemeClr val="accent1"/>
+          </a:fillRef>
+          <a:effectRef idx="0">
+            <a:schemeClr val="accent1"/>
+          </a:effectRef>
+          <a:fontRef idx="minor">
+            <a:schemeClr val="tx1"/>
+          </a:fontRef>
+        </p:style>
+      </p:cxnSp>
     </p:spTree>
     <p:extLst>
       <p:ext uri="{BB962C8B-B14F-4D97-AF65-F5344CB8AC3E}">

</xml_diff>

<commit_message>
started to implement ressource grid subscriber and axi ring writer
</commit_message>
<xml_diff>
--- a/doc/overview.pptx
+++ b/doc/overview.pptx
@@ -8828,7 +8828,7 @@
         </p:nvCxnSpPr>
         <p:spPr>
           <a:xfrm>
-            <a:off x="9340878" y="4021180"/>
+            <a:off x="9340878" y="4087593"/>
             <a:ext cx="427389" cy="0"/>
           </a:xfrm>
           <a:prstGeom prst="straightConnector1">
@@ -9026,7 +9026,7 @@
         </p:nvCxnSpPr>
         <p:spPr>
           <a:xfrm flipH="1">
-            <a:off x="9340877" y="4274203"/>
+            <a:off x="9332123" y="4351201"/>
             <a:ext cx="427389" cy="0"/>
           </a:xfrm>
           <a:prstGeom prst="straightConnector1">
@@ -9068,8 +9068,8 @@
         </p:nvSpPr>
         <p:spPr>
           <a:xfrm>
-            <a:off x="9331088" y="4047388"/>
-            <a:ext cx="472052" cy="276999"/>
+            <a:off x="9279523" y="4095752"/>
+            <a:ext cx="557973" cy="276999"/>
           </a:xfrm>
           <a:prstGeom prst="rect">
             <a:avLst/>
@@ -9084,43 +9084,7 @@
           <a:p>
             <a:r>
               <a:rPr lang="en-US" sz="1200" dirty="0"/>
-              <a:t>busy</a:t>
-            </a:r>
-            <a:endParaRPr lang="en-GB" sz="1200" dirty="0"/>
-          </a:p>
-        </p:txBody>
-      </p:sp>
-      <p:sp>
-        <p:nvSpPr>
-          <p:cNvPr id="104" name="TextBox 61">
-            <a:extLst>
-              <a:ext uri="{FF2B5EF4-FFF2-40B4-BE49-F238E27FC236}">
-                <a16:creationId xmlns:a16="http://schemas.microsoft.com/office/drawing/2014/main" id="{F1D18C40-6A99-D79A-A3FD-69FCFF2D05F9}"/>
-              </a:ext>
-            </a:extLst>
-          </p:cNvPr>
-          <p:cNvSpPr txBox="1"/>
-          <p:nvPr/>
-        </p:nvSpPr>
-        <p:spPr>
-          <a:xfrm>
-            <a:off x="9288354" y="3783274"/>
-            <a:ext cx="511743" cy="276999"/>
-          </a:xfrm>
-          <a:prstGeom prst="rect">
-            <a:avLst/>
-          </a:prstGeom>
-          <a:noFill/>
-        </p:spPr>
-        <p:txBody>
-          <a:bodyPr wrap="none" rtlCol="0">
-            <a:spAutoFit/>
-          </a:bodyPr>
-          <a:lstStyle/>
-          <a:p>
-            <a:r>
-              <a:rPr lang="en-US" sz="1200" dirty="0" err="1"/>
-              <a:t>bram</a:t>
+              <a:t>status</a:t>
             </a:r>
             <a:endParaRPr lang="en-GB" sz="1200" dirty="0"/>
           </a:p>
@@ -9142,7 +9106,7 @@
         </p:nvCxnSpPr>
         <p:spPr>
           <a:xfrm>
-            <a:off x="9340877" y="4712178"/>
+            <a:off x="9344292" y="4610132"/>
             <a:ext cx="420559" cy="0"/>
           </a:xfrm>
           <a:prstGeom prst="straightConnector1">
@@ -9184,7 +9148,7 @@
         </p:nvSpPr>
         <p:spPr>
           <a:xfrm>
-            <a:off x="9304477" y="4496141"/>
+            <a:off x="9290064" y="4375123"/>
             <a:ext cx="471219" cy="276999"/>
           </a:xfrm>
           <a:prstGeom prst="rect">
@@ -9201,86 +9165,6 @@
             <a:r>
               <a:rPr lang="en-US" sz="1200" dirty="0"/>
               <a:t>start</a:t>
-            </a:r>
-            <a:endParaRPr lang="en-GB" sz="1200" dirty="0"/>
-          </a:p>
-        </p:txBody>
-      </p:sp>
-      <p:cxnSp>
-        <p:nvCxnSpPr>
-          <p:cNvPr id="126" name="Straight Arrow Connector 20">
-            <a:extLst>
-              <a:ext uri="{FF2B5EF4-FFF2-40B4-BE49-F238E27FC236}">
-                <a16:creationId xmlns:a16="http://schemas.microsoft.com/office/drawing/2014/main" id="{0FABC181-EE53-2D02-455D-60B36FCA70C5}"/>
-              </a:ext>
-            </a:extLst>
-          </p:cNvPr>
-          <p:cNvCxnSpPr>
-            <a:cxnSpLocks/>
-          </p:cNvCxnSpPr>
-          <p:nvPr/>
-        </p:nvCxnSpPr>
-        <p:spPr>
-          <a:xfrm flipH="1">
-            <a:off x="9338898" y="4485980"/>
-            <a:ext cx="427389" cy="0"/>
-          </a:xfrm>
-          <a:prstGeom prst="straightConnector1">
-            <a:avLst/>
-          </a:prstGeom>
-          <a:ln w="19050">
-            <a:solidFill>
-              <a:srgbClr val="FFC000"/>
-            </a:solidFill>
-            <a:tailEnd type="triangle"/>
-          </a:ln>
-        </p:spPr>
-        <p:style>
-          <a:lnRef idx="1">
-            <a:schemeClr val="accent1"/>
-          </a:lnRef>
-          <a:fillRef idx="0">
-            <a:schemeClr val="accent1"/>
-          </a:fillRef>
-          <a:effectRef idx="0">
-            <a:schemeClr val="accent1"/>
-          </a:effectRef>
-          <a:fontRef idx="minor">
-            <a:schemeClr val="tx1"/>
-          </a:fontRef>
-        </p:style>
-      </p:cxnSp>
-      <p:sp>
-        <p:nvSpPr>
-          <p:cNvPr id="128" name="TextBox 61">
-            <a:extLst>
-              <a:ext uri="{FF2B5EF4-FFF2-40B4-BE49-F238E27FC236}">
-                <a16:creationId xmlns:a16="http://schemas.microsoft.com/office/drawing/2014/main" id="{18D3C681-6AB0-F48C-A581-B2A5278D2294}"/>
-              </a:ext>
-            </a:extLst>
-          </p:cNvPr>
-          <p:cNvSpPr txBox="1"/>
-          <p:nvPr/>
-        </p:nvSpPr>
-        <p:spPr>
-          <a:xfrm>
-            <a:off x="9350610" y="4258233"/>
-            <a:ext cx="502061" cy="276999"/>
-          </a:xfrm>
-          <a:prstGeom prst="rect">
-            <a:avLst/>
-          </a:prstGeom>
-          <a:noFill/>
-        </p:spPr>
-        <p:txBody>
-          <a:bodyPr wrap="none" rtlCol="0">
-            <a:spAutoFit/>
-          </a:bodyPr>
-          <a:lstStyle/>
-          <a:p>
-            <a:r>
-              <a:rPr lang="en-US" sz="1200" dirty="0"/>
-              <a:t>ring#</a:t>
             </a:r>
             <a:endParaRPr lang="en-GB" sz="1200" dirty="0"/>
           </a:p>

</xml_diff>

<commit_message>
Add regmap to frame_sync core (#25)
* add regmap to frame_sync core
* fix overview diagram
</commit_message>
<xml_diff>
--- a/doc/overview.pptx
+++ b/doc/overview.pptx
@@ -261,7 +261,7 @@
           <a:p>
             <a:fld id="{0647E4D3-4269-40FF-ADD2-F433546F1734}" type="datetimeFigureOut">
               <a:rPr lang="en-GB" smtClean="0"/>
-              <a:t>30/05/2023</a:t>
+              <a:t>01/06/2023</a:t>
             </a:fld>
             <a:endParaRPr lang="en-GB"/>
           </a:p>
@@ -461,7 +461,7 @@
           <a:p>
             <a:fld id="{0647E4D3-4269-40FF-ADD2-F433546F1734}" type="datetimeFigureOut">
               <a:rPr lang="en-GB" smtClean="0"/>
-              <a:t>30/05/2023</a:t>
+              <a:t>01/06/2023</a:t>
             </a:fld>
             <a:endParaRPr lang="en-GB"/>
           </a:p>
@@ -671,7 +671,7 @@
           <a:p>
             <a:fld id="{0647E4D3-4269-40FF-ADD2-F433546F1734}" type="datetimeFigureOut">
               <a:rPr lang="en-GB" smtClean="0"/>
-              <a:t>30/05/2023</a:t>
+              <a:t>01/06/2023</a:t>
             </a:fld>
             <a:endParaRPr lang="en-GB"/>
           </a:p>
@@ -871,7 +871,7 @@
           <a:p>
             <a:fld id="{0647E4D3-4269-40FF-ADD2-F433546F1734}" type="datetimeFigureOut">
               <a:rPr lang="en-GB" smtClean="0"/>
-              <a:t>30/05/2023</a:t>
+              <a:t>01/06/2023</a:t>
             </a:fld>
             <a:endParaRPr lang="en-GB"/>
           </a:p>
@@ -1147,7 +1147,7 @@
           <a:p>
             <a:fld id="{0647E4D3-4269-40FF-ADD2-F433546F1734}" type="datetimeFigureOut">
               <a:rPr lang="en-GB" smtClean="0"/>
-              <a:t>30/05/2023</a:t>
+              <a:t>01/06/2023</a:t>
             </a:fld>
             <a:endParaRPr lang="en-GB"/>
           </a:p>
@@ -1415,7 +1415,7 @@
           <a:p>
             <a:fld id="{0647E4D3-4269-40FF-ADD2-F433546F1734}" type="datetimeFigureOut">
               <a:rPr lang="en-GB" smtClean="0"/>
-              <a:t>30/05/2023</a:t>
+              <a:t>01/06/2023</a:t>
             </a:fld>
             <a:endParaRPr lang="en-GB"/>
           </a:p>
@@ -1830,7 +1830,7 @@
           <a:p>
             <a:fld id="{0647E4D3-4269-40FF-ADD2-F433546F1734}" type="datetimeFigureOut">
               <a:rPr lang="en-GB" smtClean="0"/>
-              <a:t>30/05/2023</a:t>
+              <a:t>01/06/2023</a:t>
             </a:fld>
             <a:endParaRPr lang="en-GB"/>
           </a:p>
@@ -1972,7 +1972,7 @@
           <a:p>
             <a:fld id="{0647E4D3-4269-40FF-ADD2-F433546F1734}" type="datetimeFigureOut">
               <a:rPr lang="en-GB" smtClean="0"/>
-              <a:t>30/05/2023</a:t>
+              <a:t>01/06/2023</a:t>
             </a:fld>
             <a:endParaRPr lang="en-GB"/>
           </a:p>
@@ -2085,7 +2085,7 @@
           <a:p>
             <a:fld id="{0647E4D3-4269-40FF-ADD2-F433546F1734}" type="datetimeFigureOut">
               <a:rPr lang="en-GB" smtClean="0"/>
-              <a:t>30/05/2023</a:t>
+              <a:t>01/06/2023</a:t>
             </a:fld>
             <a:endParaRPr lang="en-GB"/>
           </a:p>
@@ -2398,7 +2398,7 @@
           <a:p>
             <a:fld id="{0647E4D3-4269-40FF-ADD2-F433546F1734}" type="datetimeFigureOut">
               <a:rPr lang="en-GB" smtClean="0"/>
-              <a:t>30/05/2023</a:t>
+              <a:t>01/06/2023</a:t>
             </a:fld>
             <a:endParaRPr lang="en-GB"/>
           </a:p>
@@ -2687,7 +2687,7 @@
           <a:p>
             <a:fld id="{0647E4D3-4269-40FF-ADD2-F433546F1734}" type="datetimeFigureOut">
               <a:rPr lang="en-GB" smtClean="0"/>
-              <a:t>30/05/2023</a:t>
+              <a:t>01/06/2023</a:t>
             </a:fld>
             <a:endParaRPr lang="en-GB"/>
           </a:p>
@@ -2930,7 +2930,7 @@
           <a:p>
             <a:fld id="{0647E4D3-4269-40FF-ADD2-F433546F1734}" type="datetimeFigureOut">
               <a:rPr lang="en-GB" smtClean="0"/>
-              <a:t>30/05/2023</a:t>
+              <a:t>01/06/2023</a:t>
             </a:fld>
             <a:endParaRPr lang="en-GB"/>
           </a:p>
@@ -8225,7 +8225,7 @@
         </p:nvSpPr>
         <p:spPr>
           <a:xfrm>
-            <a:off x="9399949" y="4004215"/>
+            <a:off x="6885319" y="3983851"/>
             <a:ext cx="513474" cy="276999"/>
           </a:xfrm>
           <a:prstGeom prst="rect">

</xml_diff>